<commit_message>
worked on kaggle dataset and ch01
</commit_message>
<xml_diff>
--- a/Capstone/2022-02-17 Project Introductie.pptx
+++ b/Capstone/2022-02-17 Project Introductie.pptx
@@ -107,6 +107,11 @@
       </a:defRPr>
     </a:lvl9pPr>
   </p:defaultTextStyle>
+  <p:extLst>
+    <p:ext uri="{EFAFB233-063F-42B5-8137-9DF3F51BA10A}">
+      <p15:sldGuideLst xmlns:p15="http://schemas.microsoft.com/office/powerpoint/2012/main"/>
+    </p:ext>
+  </p:extLst>
 </p:presentation>
 </file>
 
@@ -259,7 +264,7 @@
           <a:p>
             <a:fld id="{2860ACB8-54B6-4436-93E1-941EF7448498}" type="datetimeFigureOut">
               <a:rPr lang="nl-NL" smtClean="0"/>
-              <a:t>17-2-2022</a:t>
+              <a:t>22-2-2022</a:t>
             </a:fld>
             <a:endParaRPr lang="nl-NL"/>
           </a:p>
@@ -459,7 +464,7 @@
           <a:p>
             <a:fld id="{2860ACB8-54B6-4436-93E1-941EF7448498}" type="datetimeFigureOut">
               <a:rPr lang="nl-NL" smtClean="0"/>
-              <a:t>17-2-2022</a:t>
+              <a:t>22-2-2022</a:t>
             </a:fld>
             <a:endParaRPr lang="nl-NL"/>
           </a:p>
@@ -669,7 +674,7 @@
           <a:p>
             <a:fld id="{2860ACB8-54B6-4436-93E1-941EF7448498}" type="datetimeFigureOut">
               <a:rPr lang="nl-NL" smtClean="0"/>
-              <a:t>17-2-2022</a:t>
+              <a:t>22-2-2022</a:t>
             </a:fld>
             <a:endParaRPr lang="nl-NL"/>
           </a:p>
@@ -869,7 +874,7 @@
           <a:p>
             <a:fld id="{2860ACB8-54B6-4436-93E1-941EF7448498}" type="datetimeFigureOut">
               <a:rPr lang="nl-NL" smtClean="0"/>
-              <a:t>17-2-2022</a:t>
+              <a:t>22-2-2022</a:t>
             </a:fld>
             <a:endParaRPr lang="nl-NL"/>
           </a:p>
@@ -1145,7 +1150,7 @@
           <a:p>
             <a:fld id="{2860ACB8-54B6-4436-93E1-941EF7448498}" type="datetimeFigureOut">
               <a:rPr lang="nl-NL" smtClean="0"/>
-              <a:t>17-2-2022</a:t>
+              <a:t>22-2-2022</a:t>
             </a:fld>
             <a:endParaRPr lang="nl-NL"/>
           </a:p>
@@ -1413,7 +1418,7 @@
           <a:p>
             <a:fld id="{2860ACB8-54B6-4436-93E1-941EF7448498}" type="datetimeFigureOut">
               <a:rPr lang="nl-NL" smtClean="0"/>
-              <a:t>17-2-2022</a:t>
+              <a:t>22-2-2022</a:t>
             </a:fld>
             <a:endParaRPr lang="nl-NL"/>
           </a:p>
@@ -1828,7 +1833,7 @@
           <a:p>
             <a:fld id="{2860ACB8-54B6-4436-93E1-941EF7448498}" type="datetimeFigureOut">
               <a:rPr lang="nl-NL" smtClean="0"/>
-              <a:t>17-2-2022</a:t>
+              <a:t>22-2-2022</a:t>
             </a:fld>
             <a:endParaRPr lang="nl-NL"/>
           </a:p>
@@ -1970,7 +1975,7 @@
           <a:p>
             <a:fld id="{2860ACB8-54B6-4436-93E1-941EF7448498}" type="datetimeFigureOut">
               <a:rPr lang="nl-NL" smtClean="0"/>
-              <a:t>17-2-2022</a:t>
+              <a:t>22-2-2022</a:t>
             </a:fld>
             <a:endParaRPr lang="nl-NL"/>
           </a:p>
@@ -2083,7 +2088,7 @@
           <a:p>
             <a:fld id="{2860ACB8-54B6-4436-93E1-941EF7448498}" type="datetimeFigureOut">
               <a:rPr lang="nl-NL" smtClean="0"/>
-              <a:t>17-2-2022</a:t>
+              <a:t>22-2-2022</a:t>
             </a:fld>
             <a:endParaRPr lang="nl-NL"/>
           </a:p>
@@ -2396,7 +2401,7 @@
           <a:p>
             <a:fld id="{2860ACB8-54B6-4436-93E1-941EF7448498}" type="datetimeFigureOut">
               <a:rPr lang="nl-NL" smtClean="0"/>
-              <a:t>17-2-2022</a:t>
+              <a:t>22-2-2022</a:t>
             </a:fld>
             <a:endParaRPr lang="nl-NL"/>
           </a:p>
@@ -2685,7 +2690,7 @@
           <a:p>
             <a:fld id="{2860ACB8-54B6-4436-93E1-941EF7448498}" type="datetimeFigureOut">
               <a:rPr lang="nl-NL" smtClean="0"/>
-              <a:t>17-2-2022</a:t>
+              <a:t>22-2-2022</a:t>
             </a:fld>
             <a:endParaRPr lang="nl-NL"/>
           </a:p>
@@ -2928,7 +2933,7 @@
           <a:p>
             <a:fld id="{2860ACB8-54B6-4436-93E1-941EF7448498}" type="datetimeFigureOut">
               <a:rPr lang="nl-NL" smtClean="0"/>
-              <a:t>17-2-2022</a:t>
+              <a:t>22-2-2022</a:t>
             </a:fld>
             <a:endParaRPr lang="nl-NL"/>
           </a:p>
@@ -3486,45 +3491,47 @@
         </p:nvSpPr>
         <p:spPr/>
         <p:txBody>
-          <a:bodyPr/>
-          <a:lstStyle/>
-          <a:p>
-            <a:r>
-              <a:rPr lang="nl-NL" dirty="0"/>
+          <a:bodyPr>
+            <a:normAutofit/>
+          </a:bodyPr>
+          <a:lstStyle/>
+          <a:p>
+            <a:r>
+              <a:rPr lang="nl-NL" sz="2400" dirty="0"/>
               <a:t>Uitstroom afgelopen jaar bij </a:t>
             </a:r>
             <a:r>
-              <a:rPr lang="nl-NL" dirty="0" err="1"/>
+              <a:rPr lang="nl-NL" sz="2400" dirty="0" err="1"/>
               <a:t>HoB</a:t>
             </a:r>
             <a:r>
-              <a:rPr lang="nl-NL" dirty="0"/>
+              <a:rPr lang="nl-NL" sz="2400" dirty="0"/>
               <a:t> (2021) laag maar dit zal niet altijd aanhouden</a:t>
             </a:r>
           </a:p>
           <a:p>
             <a:r>
-              <a:rPr lang="nl-NL" dirty="0"/>
+              <a:rPr lang="nl-NL" sz="2400" dirty="0"/>
               <a:t>Uitstroom T&amp;P hoger tijdens corona gaat </a:t>
             </a:r>
             <a:r>
-              <a:rPr lang="nl-NL" dirty="0" err="1"/>
+              <a:rPr lang="nl-NL" sz="2400" dirty="0" err="1"/>
               <a:t>HoB</a:t>
             </a:r>
             <a:r>
-              <a:rPr lang="nl-NL" dirty="0"/>
+              <a:rPr lang="nl-NL" sz="2400" dirty="0"/>
               <a:t> hierop volgen</a:t>
             </a:r>
           </a:p>
           <a:p>
-            <a:endParaRPr lang="nl-NL" dirty="0"/>
+            <a:endParaRPr lang="nl-NL" sz="2400" dirty="0"/>
           </a:p>
           <a:p>
             <a:pPr marL="0" indent="0">
               <a:buNone/>
             </a:pPr>
             <a:r>
-              <a:rPr lang="nl-NL" b="1" dirty="0"/>
+              <a:rPr lang="nl-NL" sz="2400" b="1" dirty="0"/>
               <a:t>Business doel:</a:t>
             </a:r>
           </a:p>
@@ -3533,9 +3540,55 @@
               <a:buNone/>
             </a:pPr>
             <a:r>
-              <a:rPr lang="nl-NL" i="1" dirty="0"/>
+              <a:rPr lang="nl-NL" sz="2000" i="1" dirty="0"/>
               <a:t>“(visueel en) tijdig inzicht in de mogelijke uitstroom van collega’s zodat People Managers (PM) en Account Managers (AM) de collega kunnen ondersteunen en begeleiden naar een andere opdracht, andere werkgever of een andere oplossing kunnen bieden.”</a:t>
             </a:r>
+          </a:p>
+          <a:p>
+            <a:pPr marL="0" indent="0">
+              <a:buNone/>
+            </a:pPr>
+            <a:r>
+              <a:rPr lang="nl-NL" sz="2400" b="1" dirty="0"/>
+              <a:t>Onderzoeksvraag:</a:t>
+            </a:r>
+          </a:p>
+          <a:p>
+            <a:pPr marL="0" indent="0">
+              <a:buNone/>
+            </a:pPr>
+            <a:r>
+              <a:rPr lang="nl-NL" sz="2000" i="1" dirty="0"/>
+              <a:t>“Wat zijn kenmerkende drivers van </a:t>
+            </a:r>
+            <a:r>
+              <a:rPr lang="nl-NL" sz="2000" i="1" dirty="0" err="1"/>
+              <a:t>HoB</a:t>
+            </a:r>
+            <a:r>
+              <a:rPr lang="nl-NL" sz="2000" i="1" dirty="0"/>
+              <a:t> en T&amp;P consultants die dreigen uit te stromen, op basis van LinkedIn data, waarin accountmanagers en People Managers een rol kunnen spelen voor het mogelijke behouden </a:t>
+            </a:r>
+            <a:r>
+              <a:rPr lang="nl-NL" sz="2000" i="1" dirty="0" err="1"/>
+              <a:t>danwel</a:t>
+            </a:r>
+            <a:r>
+              <a:rPr lang="nl-NL" sz="2000" i="1" dirty="0"/>
+              <a:t> fijne transitie van deze consultants.”</a:t>
+            </a:r>
+          </a:p>
+          <a:p>
+            <a:pPr marL="0" indent="0">
+              <a:buNone/>
+            </a:pPr>
+            <a:endParaRPr lang="nl-NL" i="1" dirty="0"/>
+          </a:p>
+          <a:p>
+            <a:pPr marL="0" indent="0">
+              <a:buNone/>
+            </a:pPr>
+            <a:endParaRPr lang="nl-NL" i="1" dirty="0"/>
           </a:p>
           <a:p>
             <a:endParaRPr lang="nl-NL" dirty="0"/>

</xml_diff>